<commit_message>
Updated BuildingTheBackend deck name
</commit_message>
<xml_diff>
--- a/Presentation/BuildingTheBackend/BuildingTheBackend.pptx
+++ b/Presentation/BuildingTheBackend/BuildingTheBackend.pptx
@@ -224,7 +224,7 @@
           <a:p>
             <a:fld id="{312E7B4A-039C-48A2-9B2C-AF16AA3873D8}" type="datetimeFigureOut">
               <a:rPr lang="en-US" smtClean="0"/>
-              <a:t>07/07/2015</a:t>
+              <a:t>15/07/2015</a:t>
             </a:fld>
             <a:endParaRPr lang="en-US"/>
           </a:p>
@@ -389,7 +389,7 @@
           <a:p>
             <a:fld id="{DA005A0C-54D9-45AA-87D4-C551D08DFCE1}" type="datetimeFigureOut">
               <a:rPr lang="en-US" smtClean="0"/>
-              <a:t>07/07/2015</a:t>
+              <a:t>15/07/2015</a:t>
             </a:fld>
             <a:endParaRPr lang="en-US"/>
           </a:p>
@@ -17148,28 +17148,18 @@
           <a:p>
             <a:pPr marL="914400" indent="-914400"/>
             <a:r>
+              <a:rPr lang="en-US" sz="7200" smtClean="0"/>
+              <a:t>Building </a:t>
+            </a:r>
+            <a:r>
+              <a:rPr lang="en-US" sz="7200" smtClean="0"/>
+              <a:t>the </a:t>
+            </a:r>
+            <a:r>
               <a:rPr lang="en-US" sz="7200" dirty="0" smtClean="0"/>
-              <a:t>Building </a:t>
-            </a:r>
-            <a:r>
-              <a:rPr lang="en-US" sz="7200" dirty="0"/>
-              <a:t>a Backend </a:t>
-            </a:r>
-            <a:r>
-              <a:rPr lang="en-US" sz="7200" dirty="0" smtClean="0"/>
-              <a:t>with</a:t>
-            </a:r>
-            <a:br>
-              <a:rPr lang="en-US" sz="7200" dirty="0" smtClean="0"/>
-            </a:br>
-            <a:r>
-              <a:rPr lang="en-US" sz="7200" dirty="0" smtClean="0"/>
-              <a:t>Socket.IO </a:t>
-            </a:r>
-            <a:r>
-              <a:rPr lang="en-US" sz="7200" dirty="0"/>
-              <a:t>and Mongo</a:t>
-            </a:r>
+              <a:t>Backend</a:t>
+            </a:r>
+            <a:endParaRPr lang="en-US" sz="7200" dirty="0"/>
           </a:p>
         </p:txBody>
       </p:sp>

</xml_diff>

<commit_message>
Added reveal.js version of the BuildingTheBackend presentation
</commit_message>
<xml_diff>
--- a/Presentation/BuildingTheBackend/BuildingTheBackend.pptx
+++ b/Presentation/BuildingTheBackend/BuildingTheBackend.pptx
@@ -227,7 +227,7 @@
           <a:p>
             <a:fld id="{312E7B4A-039C-48A2-9B2C-AF16AA3873D8}" type="datetimeFigureOut">
               <a:rPr lang="en-US" smtClean="0"/>
-              <a:t>7/22/2015</a:t>
+              <a:t>1/22/2016</a:t>
             </a:fld>
             <a:endParaRPr lang="en-US"/>
           </a:p>
@@ -392,7 +392,7 @@
           <a:p>
             <a:fld id="{DA005A0C-54D9-45AA-87D4-C551D08DFCE1}" type="datetimeFigureOut">
               <a:rPr lang="en-US" smtClean="0"/>
-              <a:t>7/22/2015</a:t>
+              <a:t>1/22/2016</a:t>
             </a:fld>
             <a:endParaRPr lang="en-US"/>
           </a:p>
@@ -2193,10 +2193,34 @@
                 <a:tableStyleId>{5C22544A-7EE6-4342-B048-85BDC9FD1C3A}</a:tableStyleId>
               </a:tblPr>
               <a:tblGrid>
-                <a:gridCol w="2764105"/>
-                <a:gridCol w="2764105"/>
-                <a:gridCol w="2764105"/>
-                <a:gridCol w="2764105"/>
+                <a:gridCol w="2764105">
+                  <a:extLst>
+                    <a:ext uri="{9D8B030D-6E8A-4147-A177-3AD203B41FA5}">
+                      <a16:colId xmlns:a16="http://schemas.microsoft.com/office/drawing/2014/main" val="20000"/>
+                    </a:ext>
+                  </a:extLst>
+                </a:gridCol>
+                <a:gridCol w="2764105">
+                  <a:extLst>
+                    <a:ext uri="{9D8B030D-6E8A-4147-A177-3AD203B41FA5}">
+                      <a16:colId xmlns:a16="http://schemas.microsoft.com/office/drawing/2014/main" val="20001"/>
+                    </a:ext>
+                  </a:extLst>
+                </a:gridCol>
+                <a:gridCol w="2764105">
+                  <a:extLst>
+                    <a:ext uri="{9D8B030D-6E8A-4147-A177-3AD203B41FA5}">
+                      <a16:colId xmlns:a16="http://schemas.microsoft.com/office/drawing/2014/main" val="20002"/>
+                    </a:ext>
+                  </a:extLst>
+                </a:gridCol>
+                <a:gridCol w="2764105">
+                  <a:extLst>
+                    <a:ext uri="{9D8B030D-6E8A-4147-A177-3AD203B41FA5}">
+                      <a16:colId xmlns:a16="http://schemas.microsoft.com/office/drawing/2014/main" val="20003"/>
+                    </a:ext>
+                  </a:extLst>
+                </a:gridCol>
               </a:tblGrid>
               <a:tr h="644435">
                 <a:tc>
@@ -2371,6 +2395,11 @@
                     </a:lnBlToTr>
                   </a:tcPr>
                 </a:tc>
+                <a:extLst>
+                  <a:ext uri="{0D108BD9-81ED-4DB2-BD59-A6C34878D82A}">
+                    <a16:rowId xmlns:a16="http://schemas.microsoft.com/office/drawing/2014/main" val="10000"/>
+                  </a:ext>
+                </a:extLst>
               </a:tr>
               <a:tr h="1225319">
                 <a:tc>
@@ -2602,6 +2631,11 @@
                     </a:lnBlToTr>
                   </a:tcPr>
                 </a:tc>
+                <a:extLst>
+                  <a:ext uri="{0D108BD9-81ED-4DB2-BD59-A6C34878D82A}">
+                    <a16:rowId xmlns:a16="http://schemas.microsoft.com/office/drawing/2014/main" val="10001"/>
+                  </a:ext>
+                </a:extLst>
               </a:tr>
               <a:tr h="1225319">
                 <a:tc>
@@ -2852,6 +2886,11 @@
                     </a:lnBlToTr>
                   </a:tcPr>
                 </a:tc>
+                <a:extLst>
+                  <a:ext uri="{0D108BD9-81ED-4DB2-BD59-A6C34878D82A}">
+                    <a16:rowId xmlns:a16="http://schemas.microsoft.com/office/drawing/2014/main" val="10002"/>
+                  </a:ext>
+                </a:extLst>
               </a:tr>
               <a:tr h="1225319">
                 <a:tc>
@@ -3102,6 +3141,11 @@
                     </a:lnBlToTr>
                   </a:tcPr>
                 </a:tc>
+                <a:extLst>
+                  <a:ext uri="{0D108BD9-81ED-4DB2-BD59-A6C34878D82A}">
+                    <a16:rowId xmlns:a16="http://schemas.microsoft.com/office/drawing/2014/main" val="10003"/>
+                  </a:ext>
+                </a:extLst>
               </a:tr>
             </a:tbl>
           </a:graphicData>
@@ -5095,10 +5139,34 @@
                 <a:tableStyleId>{93296810-A885-4BE3-A3E7-6D5BEEA58F35}</a:tableStyleId>
               </a:tblPr>
               <a:tblGrid>
-                <a:gridCol w="2764105"/>
-                <a:gridCol w="2764105"/>
-                <a:gridCol w="2764105"/>
-                <a:gridCol w="2764105"/>
+                <a:gridCol w="2764105">
+                  <a:extLst>
+                    <a:ext uri="{9D8B030D-6E8A-4147-A177-3AD203B41FA5}">
+                      <a16:colId xmlns:a16="http://schemas.microsoft.com/office/drawing/2014/main" val="20000"/>
+                    </a:ext>
+                  </a:extLst>
+                </a:gridCol>
+                <a:gridCol w="2764105">
+                  <a:extLst>
+                    <a:ext uri="{9D8B030D-6E8A-4147-A177-3AD203B41FA5}">
+                      <a16:colId xmlns:a16="http://schemas.microsoft.com/office/drawing/2014/main" val="20001"/>
+                    </a:ext>
+                  </a:extLst>
+                </a:gridCol>
+                <a:gridCol w="2764105">
+                  <a:extLst>
+                    <a:ext uri="{9D8B030D-6E8A-4147-A177-3AD203B41FA5}">
+                      <a16:colId xmlns:a16="http://schemas.microsoft.com/office/drawing/2014/main" val="20002"/>
+                    </a:ext>
+                  </a:extLst>
+                </a:gridCol>
+                <a:gridCol w="2764105">
+                  <a:extLst>
+                    <a:ext uri="{9D8B030D-6E8A-4147-A177-3AD203B41FA5}">
+                      <a16:colId xmlns:a16="http://schemas.microsoft.com/office/drawing/2014/main" val="20003"/>
+                    </a:ext>
+                  </a:extLst>
+                </a:gridCol>
               </a:tblGrid>
               <a:tr h="644435">
                 <a:tc>
@@ -5257,6 +5325,11 @@
                     </a:lnBlToTr>
                   </a:tcPr>
                 </a:tc>
+                <a:extLst>
+                  <a:ext uri="{0D108BD9-81ED-4DB2-BD59-A6C34878D82A}">
+                    <a16:rowId xmlns:a16="http://schemas.microsoft.com/office/drawing/2014/main" val="10000"/>
+                  </a:ext>
+                </a:extLst>
               </a:tr>
               <a:tr h="1225319">
                 <a:tc>
@@ -5472,6 +5545,11 @@
                     </a:lnBlToTr>
                   </a:tcPr>
                 </a:tc>
+                <a:extLst>
+                  <a:ext uri="{0D108BD9-81ED-4DB2-BD59-A6C34878D82A}">
+                    <a16:rowId xmlns:a16="http://schemas.microsoft.com/office/drawing/2014/main" val="10001"/>
+                  </a:ext>
+                </a:extLst>
               </a:tr>
               <a:tr h="1225319">
                 <a:tc>
@@ -5706,6 +5784,11 @@
                     </a:lnBlToTr>
                   </a:tcPr>
                 </a:tc>
+                <a:extLst>
+                  <a:ext uri="{0D108BD9-81ED-4DB2-BD59-A6C34878D82A}">
+                    <a16:rowId xmlns:a16="http://schemas.microsoft.com/office/drawing/2014/main" val="10002"/>
+                  </a:ext>
+                </a:extLst>
               </a:tr>
               <a:tr h="1225319">
                 <a:tc>
@@ -5940,6 +6023,11 @@
                     </a:lnBlToTr>
                   </a:tcPr>
                 </a:tc>
+                <a:extLst>
+                  <a:ext uri="{0D108BD9-81ED-4DB2-BD59-A6C34878D82A}">
+                    <a16:rowId xmlns:a16="http://schemas.microsoft.com/office/drawing/2014/main" val="10003"/>
+                  </a:ext>
+                </a:extLst>
               </a:tr>
             </a:tbl>
           </a:graphicData>
@@ -6812,10 +6900,34 @@
                 <a:tableStyleId>{21E4AEA4-8DFA-4A89-87EB-49C32662AFE0}</a:tableStyleId>
               </a:tblPr>
               <a:tblGrid>
-                <a:gridCol w="2764105"/>
-                <a:gridCol w="2764105"/>
-                <a:gridCol w="2764105"/>
-                <a:gridCol w="2764105"/>
+                <a:gridCol w="2764105">
+                  <a:extLst>
+                    <a:ext uri="{9D8B030D-6E8A-4147-A177-3AD203B41FA5}">
+                      <a16:colId xmlns:a16="http://schemas.microsoft.com/office/drawing/2014/main" val="20000"/>
+                    </a:ext>
+                  </a:extLst>
+                </a:gridCol>
+                <a:gridCol w="2764105">
+                  <a:extLst>
+                    <a:ext uri="{9D8B030D-6E8A-4147-A177-3AD203B41FA5}">
+                      <a16:colId xmlns:a16="http://schemas.microsoft.com/office/drawing/2014/main" val="20001"/>
+                    </a:ext>
+                  </a:extLst>
+                </a:gridCol>
+                <a:gridCol w="2764105">
+                  <a:extLst>
+                    <a:ext uri="{9D8B030D-6E8A-4147-A177-3AD203B41FA5}">
+                      <a16:colId xmlns:a16="http://schemas.microsoft.com/office/drawing/2014/main" val="20002"/>
+                    </a:ext>
+                  </a:extLst>
+                </a:gridCol>
+                <a:gridCol w="2764105">
+                  <a:extLst>
+                    <a:ext uri="{9D8B030D-6E8A-4147-A177-3AD203B41FA5}">
+                      <a16:colId xmlns:a16="http://schemas.microsoft.com/office/drawing/2014/main" val="20003"/>
+                    </a:ext>
+                  </a:extLst>
+                </a:gridCol>
               </a:tblGrid>
               <a:tr h="644435">
                 <a:tc>
@@ -6986,6 +7098,11 @@
                     </a:solidFill>
                   </a:tcPr>
                 </a:tc>
+                <a:extLst>
+                  <a:ext uri="{0D108BD9-81ED-4DB2-BD59-A6C34878D82A}">
+                    <a16:rowId xmlns:a16="http://schemas.microsoft.com/office/drawing/2014/main" val="10000"/>
+                  </a:ext>
+                </a:extLst>
               </a:tr>
               <a:tr h="1225319">
                 <a:tc>
@@ -7213,6 +7330,11 @@
                     </a:solidFill>
                   </a:tcPr>
                 </a:tc>
+                <a:extLst>
+                  <a:ext uri="{0D108BD9-81ED-4DB2-BD59-A6C34878D82A}">
+                    <a16:rowId xmlns:a16="http://schemas.microsoft.com/office/drawing/2014/main" val="10001"/>
+                  </a:ext>
+                </a:extLst>
               </a:tr>
               <a:tr h="1225319">
                 <a:tc>
@@ -7467,6 +7589,11 @@
                     </a:solidFill>
                   </a:tcPr>
                 </a:tc>
+                <a:extLst>
+                  <a:ext uri="{0D108BD9-81ED-4DB2-BD59-A6C34878D82A}">
+                    <a16:rowId xmlns:a16="http://schemas.microsoft.com/office/drawing/2014/main" val="10002"/>
+                  </a:ext>
+                </a:extLst>
               </a:tr>
               <a:tr h="1225319">
                 <a:tc>
@@ -7713,6 +7840,11 @@
                     </a:solidFill>
                   </a:tcPr>
                 </a:tc>
+                <a:extLst>
+                  <a:ext uri="{0D108BD9-81ED-4DB2-BD59-A6C34878D82A}">
+                    <a16:rowId xmlns:a16="http://schemas.microsoft.com/office/drawing/2014/main" val="10003"/>
+                  </a:ext>
+                </a:extLst>
               </a:tr>
             </a:tbl>
           </a:graphicData>
@@ -8694,10 +8826,34 @@
                 <a:tableStyleId>{5C22544A-7EE6-4342-B048-85BDC9FD1C3A}</a:tableStyleId>
               </a:tblPr>
               <a:tblGrid>
-                <a:gridCol w="2764105"/>
-                <a:gridCol w="2764105"/>
-                <a:gridCol w="2764105"/>
-                <a:gridCol w="2764105"/>
+                <a:gridCol w="2764105">
+                  <a:extLst>
+                    <a:ext uri="{9D8B030D-6E8A-4147-A177-3AD203B41FA5}">
+                      <a16:colId xmlns:a16="http://schemas.microsoft.com/office/drawing/2014/main" val="20000"/>
+                    </a:ext>
+                  </a:extLst>
+                </a:gridCol>
+                <a:gridCol w="2764105">
+                  <a:extLst>
+                    <a:ext uri="{9D8B030D-6E8A-4147-A177-3AD203B41FA5}">
+                      <a16:colId xmlns:a16="http://schemas.microsoft.com/office/drawing/2014/main" val="20001"/>
+                    </a:ext>
+                  </a:extLst>
+                </a:gridCol>
+                <a:gridCol w="2764105">
+                  <a:extLst>
+                    <a:ext uri="{9D8B030D-6E8A-4147-A177-3AD203B41FA5}">
+                      <a16:colId xmlns:a16="http://schemas.microsoft.com/office/drawing/2014/main" val="20002"/>
+                    </a:ext>
+                  </a:extLst>
+                </a:gridCol>
+                <a:gridCol w="2764105">
+                  <a:extLst>
+                    <a:ext uri="{9D8B030D-6E8A-4147-A177-3AD203B41FA5}">
+                      <a16:colId xmlns:a16="http://schemas.microsoft.com/office/drawing/2014/main" val="20003"/>
+                    </a:ext>
+                  </a:extLst>
+                </a:gridCol>
               </a:tblGrid>
               <a:tr h="644435">
                 <a:tc>
@@ -8872,6 +9028,11 @@
                     </a:lnBlToTr>
                   </a:tcPr>
                 </a:tc>
+                <a:extLst>
+                  <a:ext uri="{0D108BD9-81ED-4DB2-BD59-A6C34878D82A}">
+                    <a16:rowId xmlns:a16="http://schemas.microsoft.com/office/drawing/2014/main" val="10000"/>
+                  </a:ext>
+                </a:extLst>
               </a:tr>
               <a:tr h="1225319">
                 <a:tc>
@@ -9103,6 +9264,11 @@
                     </a:lnBlToTr>
                   </a:tcPr>
                 </a:tc>
+                <a:extLst>
+                  <a:ext uri="{0D108BD9-81ED-4DB2-BD59-A6C34878D82A}">
+                    <a16:rowId xmlns:a16="http://schemas.microsoft.com/office/drawing/2014/main" val="10001"/>
+                  </a:ext>
+                </a:extLst>
               </a:tr>
               <a:tr h="1225319">
                 <a:tc>
@@ -9353,6 +9519,11 @@
                     </a:lnBlToTr>
                   </a:tcPr>
                 </a:tc>
+                <a:extLst>
+                  <a:ext uri="{0D108BD9-81ED-4DB2-BD59-A6C34878D82A}">
+                    <a16:rowId xmlns:a16="http://schemas.microsoft.com/office/drawing/2014/main" val="10002"/>
+                  </a:ext>
+                </a:extLst>
               </a:tr>
               <a:tr h="1225319">
                 <a:tc>
@@ -9603,6 +9774,11 @@
                     </a:lnBlToTr>
                   </a:tcPr>
                 </a:tc>
+                <a:extLst>
+                  <a:ext uri="{0D108BD9-81ED-4DB2-BD59-A6C34878D82A}">
+                    <a16:rowId xmlns:a16="http://schemas.microsoft.com/office/drawing/2014/main" val="10003"/>
+                  </a:ext>
+                </a:extLst>
               </a:tr>
             </a:tbl>
           </a:graphicData>
@@ -10584,10 +10760,34 @@
                 <a:tableStyleId>{5C22544A-7EE6-4342-B048-85BDC9FD1C3A}</a:tableStyleId>
               </a:tblPr>
               <a:tblGrid>
-                <a:gridCol w="2764105"/>
-                <a:gridCol w="2764105"/>
-                <a:gridCol w="2764105"/>
-                <a:gridCol w="2764105"/>
+                <a:gridCol w="2764105">
+                  <a:extLst>
+                    <a:ext uri="{9D8B030D-6E8A-4147-A177-3AD203B41FA5}">
+                      <a16:colId xmlns:a16="http://schemas.microsoft.com/office/drawing/2014/main" val="20000"/>
+                    </a:ext>
+                  </a:extLst>
+                </a:gridCol>
+                <a:gridCol w="2764105">
+                  <a:extLst>
+                    <a:ext uri="{9D8B030D-6E8A-4147-A177-3AD203B41FA5}">
+                      <a16:colId xmlns:a16="http://schemas.microsoft.com/office/drawing/2014/main" val="20001"/>
+                    </a:ext>
+                  </a:extLst>
+                </a:gridCol>
+                <a:gridCol w="2764105">
+                  <a:extLst>
+                    <a:ext uri="{9D8B030D-6E8A-4147-A177-3AD203B41FA5}">
+                      <a16:colId xmlns:a16="http://schemas.microsoft.com/office/drawing/2014/main" val="20002"/>
+                    </a:ext>
+                  </a:extLst>
+                </a:gridCol>
+                <a:gridCol w="2764105">
+                  <a:extLst>
+                    <a:ext uri="{9D8B030D-6E8A-4147-A177-3AD203B41FA5}">
+                      <a16:colId xmlns:a16="http://schemas.microsoft.com/office/drawing/2014/main" val="20003"/>
+                    </a:ext>
+                  </a:extLst>
+                </a:gridCol>
               </a:tblGrid>
               <a:tr h="644435">
                 <a:tc>
@@ -10762,6 +10962,11 @@
                     </a:lnBlToTr>
                   </a:tcPr>
                 </a:tc>
+                <a:extLst>
+                  <a:ext uri="{0D108BD9-81ED-4DB2-BD59-A6C34878D82A}">
+                    <a16:rowId xmlns:a16="http://schemas.microsoft.com/office/drawing/2014/main" val="10000"/>
+                  </a:ext>
+                </a:extLst>
               </a:tr>
               <a:tr h="1225319">
                 <a:tc>
@@ -10993,6 +11198,11 @@
                     </a:lnBlToTr>
                   </a:tcPr>
                 </a:tc>
+                <a:extLst>
+                  <a:ext uri="{0D108BD9-81ED-4DB2-BD59-A6C34878D82A}">
+                    <a16:rowId xmlns:a16="http://schemas.microsoft.com/office/drawing/2014/main" val="10001"/>
+                  </a:ext>
+                </a:extLst>
               </a:tr>
               <a:tr h="1225319">
                 <a:tc>
@@ -11243,6 +11453,11 @@
                     </a:lnBlToTr>
                   </a:tcPr>
                 </a:tc>
+                <a:extLst>
+                  <a:ext uri="{0D108BD9-81ED-4DB2-BD59-A6C34878D82A}">
+                    <a16:rowId xmlns:a16="http://schemas.microsoft.com/office/drawing/2014/main" val="10002"/>
+                  </a:ext>
+                </a:extLst>
               </a:tr>
               <a:tr h="1225319">
                 <a:tc>
@@ -11493,6 +11708,11 @@
                     </a:lnBlToTr>
                   </a:tcPr>
                 </a:tc>
+                <a:extLst>
+                  <a:ext uri="{0D108BD9-81ED-4DB2-BD59-A6C34878D82A}">
+                    <a16:rowId xmlns:a16="http://schemas.microsoft.com/office/drawing/2014/main" val="10003"/>
+                  </a:ext>
+                </a:extLst>
               </a:tr>
             </a:tbl>
           </a:graphicData>
@@ -18331,12 +18551,8 @@
           <a:p>
             <a:pPr marL="914400" indent="-914400"/>
             <a:r>
-              <a:rPr lang="en-US" sz="7200" smtClean="0"/>
-              <a:t>Building the </a:t>
-            </a:r>
-            <a:r>
               <a:rPr lang="en-US" sz="7200" dirty="0" smtClean="0"/>
-              <a:t>Backend</a:t>
+              <a:t>Building the Backend</a:t>
             </a:r>
             <a:endParaRPr lang="en-US" sz="7200" dirty="0"/>
           </a:p>
@@ -18519,19 +18735,43 @@
           <a:p>
             <a:r>
               <a:rPr lang="en-US" dirty="0" smtClean="0"/>
-              <a:t>Different types: document based, graph databases etc.</a:t>
+              <a:t>Different types: document based, graph </a:t>
+            </a:r>
+            <a:r>
+              <a:rPr lang="en-US" dirty="0" smtClean="0"/>
+              <a:t>databases</a:t>
+            </a:r>
+            <a:r>
+              <a:rPr lang="en-US" dirty="0"/>
+              <a:t>, </a:t>
+            </a:r>
+            <a:r>
+              <a:rPr lang="en-US" dirty="0" smtClean="0"/>
+              <a:t>key-value stores, </a:t>
+            </a:r>
+            <a:r>
+              <a:rPr lang="en-US" dirty="0" smtClean="0"/>
+              <a:t>etc.</a:t>
             </a:r>
           </a:p>
           <a:p>
             <a:r>
               <a:rPr lang="en-US" dirty="0" err="1" smtClean="0"/>
-              <a:t>MongoDB</a:t>
+              <a:t>DocumentDB</a:t>
             </a:r>
             <a:r>
               <a:rPr lang="en-US" dirty="0" smtClean="0"/>
               <a:t>, </a:t>
             </a:r>
             <a:r>
+              <a:rPr lang="en-US" dirty="0" smtClean="0"/>
+              <a:t>MongoDB</a:t>
+            </a:r>
+            <a:r>
+              <a:rPr lang="en-US" dirty="0" smtClean="0"/>
+              <a:t>, </a:t>
+            </a:r>
+            <a:r>
               <a:rPr lang="en-US" dirty="0" err="1" smtClean="0"/>
               <a:t>Couchbase</a:t>
             </a:r>
@@ -18557,13 +18797,8 @@
           <a:p>
             <a:r>
               <a:rPr lang="en-US" dirty="0" smtClean="0"/>
-              <a:t>Good for large amounts of data, can </a:t>
-            </a:r>
-            <a:r>
-              <a:rPr lang="en-US" smtClean="0"/>
-              <a:t>be scaled</a:t>
-            </a:r>
-            <a:endParaRPr lang="en-US" dirty="0" smtClean="0"/>
+              <a:t>Good for large amounts of data, can be scaled</a:t>
+            </a:r>
           </a:p>
           <a:p>
             <a:pPr marL="0" indent="0">
@@ -19732,11 +19967,6 @@
               </a:rPr>
               <a:t>, NoSQL document database </a:t>
             </a:r>
-            <a:endParaRPr lang="en-US" sz="2800" dirty="0">
-              <a:solidFill>
-                <a:srgbClr val="0071BC"/>
-              </a:solidFill>
-            </a:endParaRPr>
           </a:p>
           <a:p>
             <a:pPr marL="457200" indent="-457200">
@@ -19878,11 +20108,6 @@
               </a:rPr>
               <a:t>scale</a:t>
             </a:r>
-            <a:endParaRPr lang="en-US" sz="2800" dirty="0" smtClean="0">
-              <a:solidFill>
-                <a:srgbClr val="0071BC"/>
-              </a:solidFill>
-            </a:endParaRPr>
           </a:p>
         </p:txBody>
       </p:sp>
@@ -19896,11 +20121,11 @@
   <p:clrMapOvr>
     <a:masterClrMapping/>
   </p:clrMapOvr>
-  <mc:AlternateContent xmlns:mc="http://schemas.openxmlformats.org/markup-compatibility/2006">
-    <mc:Choice xmlns:p14="http://schemas.microsoft.com/office/powerpoint/2010/main" Requires="p14">
+  <mc:AlternateContent xmlns:mc="http://schemas.openxmlformats.org/markup-compatibility/2006" xmlns:p14="http://schemas.microsoft.com/office/powerpoint/2010/main">
+    <mc:Choice Requires="p14">
       <p:transition p14:dur="0"/>
     </mc:Choice>
-    <mc:Fallback>
+    <mc:Fallback xmlns="">
       <p:transition/>
     </mc:Fallback>
   </mc:AlternateContent>
@@ -20449,7 +20674,7 @@
                 </a:solidFill>
                 <a:latin typeface="+mj-lt"/>
               </a:rPr>
-              <a:t>First </a:t>
+              <a:t>First of its kind database service to offer native support for JavaScript, SQL query </a:t>
             </a:r>
             <a:r>
               <a:rPr lang="en-US" sz="2800" dirty="0">
@@ -20458,7 +20683,7 @@
                 </a:solidFill>
                 <a:latin typeface="+mj-lt"/>
               </a:rPr>
-              <a:t>of its kind database service to offer native support for JavaScript, SQL query and transactions over </a:t>
+              <a:t>and </a:t>
             </a:r>
             <a:r>
               <a:rPr lang="en-US" sz="2800" dirty="0" smtClean="0">
@@ -20467,7 +20692,34 @@
                 </a:solidFill>
                 <a:latin typeface="+mj-lt"/>
               </a:rPr>
-              <a:t>JSON documents.</a:t>
+              <a:t>transactions </a:t>
+            </a:r>
+            <a:r>
+              <a:rPr lang="en-US" sz="2800" dirty="0">
+                <a:solidFill>
+                  <a:schemeClr val="bg1"/>
+                </a:solidFill>
+                <a:latin typeface="+mj-lt"/>
+              </a:rPr>
+              <a:t>over </a:t>
+            </a:r>
+            <a:r>
+              <a:rPr lang="en-US" sz="2800" dirty="0" smtClean="0">
+                <a:solidFill>
+                  <a:schemeClr val="bg1"/>
+                </a:solidFill>
+                <a:latin typeface="+mj-lt"/>
+              </a:rPr>
+              <a:t>JSON </a:t>
+            </a:r>
+            <a:r>
+              <a:rPr lang="en-US" sz="2800" dirty="0" smtClean="0">
+                <a:solidFill>
+                  <a:schemeClr val="bg1"/>
+                </a:solidFill>
+                <a:latin typeface="+mj-lt"/>
+              </a:rPr>
+              <a:t>documents</a:t>
             </a:r>
             <a:endParaRPr lang="en-US" sz="2800" dirty="0">
               <a:solidFill>
@@ -20928,11 +21180,11 @@
   <p:clrMapOvr>
     <a:masterClrMapping/>
   </p:clrMapOvr>
-  <mc:AlternateContent xmlns:mc="http://schemas.openxmlformats.org/markup-compatibility/2006">
-    <mc:Choice xmlns:p14="http://schemas.microsoft.com/office/powerpoint/2010/main" Requires="p14">
+  <mc:AlternateContent xmlns:mc="http://schemas.openxmlformats.org/markup-compatibility/2006" xmlns:p14="http://schemas.microsoft.com/office/powerpoint/2010/main">
+    <mc:Choice Requires="p14">
       <p:transition p14:dur="0"/>
     </mc:Choice>
-    <mc:Fallback>
+    <mc:Fallback xmlns="">
       <p:transition/>
     </mc:Fallback>
   </mc:AlternateContent>
@@ -22128,11 +22380,11 @@
   <p:clrMapOvr>
     <a:masterClrMapping/>
   </p:clrMapOvr>
-  <mc:AlternateContent xmlns:mc="http://schemas.openxmlformats.org/markup-compatibility/2006">
-    <mc:Choice xmlns:p14="http://schemas.microsoft.com/office/powerpoint/2010/main" Requires="p14">
+  <mc:AlternateContent xmlns:mc="http://schemas.openxmlformats.org/markup-compatibility/2006" xmlns:p14="http://schemas.microsoft.com/office/powerpoint/2010/main">
+    <mc:Choice Requires="p14">
       <p:transition p14:dur="0"/>
     </mc:Choice>
-    <mc:Fallback>
+    <mc:Fallback xmlns="">
       <p:transition/>
     </mc:Fallback>
   </mc:AlternateContent>
@@ -22179,22 +22431,53 @@
           </p:cNvPicPr>
           <p:nvPr/>
         </p:nvPicPr>
-        <p:blipFill>
+        <p:blipFill rotWithShape="1">
           <a:blip r:embed="rId2"/>
-          <a:stretch>
-            <a:fillRect/>
-          </a:stretch>
+          <a:srcRect t="21365"/>
+          <a:stretch/>
         </p:blipFill>
         <p:spPr>
           <a:xfrm>
-            <a:off x="205178" y="84841"/>
-            <a:ext cx="11795144" cy="6664850"/>
+            <a:off x="205178" y="1554479"/>
+            <a:ext cx="11795144" cy="5240931"/>
           </a:xfrm>
           <a:prstGeom prst="rect">
             <a:avLst/>
           </a:prstGeom>
         </p:spPr>
       </p:pic>
+      <p:sp>
+        <p:nvSpPr>
+          <p:cNvPr id="3" name="Title 5"/>
+          <p:cNvSpPr>
+            <a:spLocks noGrp="1"/>
+          </p:cNvSpPr>
+          <p:nvPr>
+            <p:ph type="title"/>
+          </p:nvPr>
+        </p:nvSpPr>
+        <p:spPr>
+          <a:xfrm>
+            <a:off x="560798" y="416496"/>
+            <a:ext cx="11079822" cy="1325563"/>
+          </a:xfrm>
+        </p:spPr>
+        <p:txBody>
+          <a:bodyPr/>
+          <a:lstStyle/>
+          <a:p>
+            <a:r>
+              <a:rPr lang="en-US" dirty="0" smtClean="0"/>
+              <a:t>DocumentDB: </a:t>
+            </a:r>
+            <a:r>
+              <a:rPr lang="en-US" dirty="0" smtClean="0"/>
+              <a:t>The Basics</a:t>
+            </a:r>
+            <a:endParaRPr lang="en-US" dirty="0"/>
+          </a:p>
+        </p:txBody>
+      </p:sp>
     </p:spTree>
     <p:extLst>
       <p:ext uri="{BB962C8B-B14F-4D97-AF65-F5344CB8AC3E}">
@@ -22205,6 +22488,13 @@
   <p:clrMapOvr>
     <a:masterClrMapping/>
   </p:clrMapOvr>
+  <p:timing>
+    <p:tnLst>
+      <p:par>
+        <p:cTn id="1" dur="indefinite" restart="never" nodeType="tmRoot"/>
+      </p:par>
+    </p:tnLst>
+  </p:timing>
 </p:sld>
 </file>
 
@@ -22576,69 +22866,6 @@
           </a:p>
         </p:txBody>
       </p:sp>
-      <p:sp>
-        <p:nvSpPr>
-          <p:cNvPr id="3" name="Content Placeholder 2"/>
-          <p:cNvSpPr>
-            <a:spLocks noGrp="1"/>
-          </p:cNvSpPr>
-          <p:nvPr>
-            <p:ph idx="1"/>
-          </p:nvPr>
-        </p:nvSpPr>
-        <p:spPr>
-          <a:xfrm>
-            <a:off x="560798" y="1876996"/>
-            <a:ext cx="5121545" cy="4215579"/>
-          </a:xfrm>
-        </p:spPr>
-        <p:txBody>
-          <a:bodyPr/>
-          <a:lstStyle/>
-          <a:p>
-            <a:r>
-              <a:rPr lang="en-US" dirty="0" smtClean="0"/>
-              <a:t>Modify </a:t>
-            </a:r>
-            <a:r>
-              <a:rPr lang="en-US" dirty="0" err="1" smtClean="0"/>
-              <a:t>package.json</a:t>
-            </a:r>
-            <a:r>
-              <a:rPr lang="en-US" dirty="0" smtClean="0"/>
-              <a:t> : </a:t>
-            </a:r>
-            <a:r>
-              <a:rPr lang="en-US" dirty="0" smtClean="0">
-                <a:latin typeface="Courier New" panose="02070309020205020404" pitchFamily="49" charset="0"/>
-                <a:cs typeface="Courier New" panose="02070309020205020404" pitchFamily="49" charset="0"/>
-              </a:rPr>
-              <a:t>"</a:t>
-            </a:r>
-            <a:r>
-              <a:rPr lang="en-US" dirty="0" err="1" smtClean="0">
-                <a:latin typeface="Courier New" panose="02070309020205020404" pitchFamily="49" charset="0"/>
-                <a:cs typeface="Courier New" panose="02070309020205020404" pitchFamily="49" charset="0"/>
-              </a:rPr>
-              <a:t>mongodb</a:t>
-            </a:r>
-            <a:r>
-              <a:rPr lang="en-US" dirty="0" smtClean="0">
-                <a:latin typeface="Courier New" panose="02070309020205020404" pitchFamily="49" charset="0"/>
-                <a:cs typeface="Courier New" panose="02070309020205020404" pitchFamily="49" charset="0"/>
-              </a:rPr>
-              <a:t>": "^1.4.10",</a:t>
-            </a:r>
-            <a:endParaRPr lang="en-US" dirty="0" smtClean="0"/>
-          </a:p>
-          <a:p>
-            <a:r>
-              <a:rPr lang="en-US" dirty="0" smtClean="0"/>
-              <a:t>Right click NPM in Visual Studio &gt; right click to install dependencies</a:t>
-            </a:r>
-          </a:p>
-        </p:txBody>
-      </p:sp>
       <p:pic>
         <p:nvPicPr>
           <p:cNvPr id="2050" name="Picture 2" descr="BLOG POST - Part 3 - Screenshot 11"/>
@@ -22691,6 +22918,101 @@
           </a:extLst>
         </p:spPr>
       </p:pic>
+      <p:sp>
+        <p:nvSpPr>
+          <p:cNvPr id="7" name="Content Placeholder 2"/>
+          <p:cNvSpPr>
+            <a:spLocks noGrp="1"/>
+          </p:cNvSpPr>
+          <p:nvPr>
+            <p:ph idx="1"/>
+          </p:nvPr>
+        </p:nvSpPr>
+        <p:spPr>
+          <a:xfrm>
+            <a:off x="560798" y="1876996"/>
+            <a:ext cx="5546088" cy="4215579"/>
+          </a:xfrm>
+        </p:spPr>
+        <p:txBody>
+          <a:bodyPr/>
+          <a:lstStyle/>
+          <a:p>
+            <a:r>
+              <a:rPr lang="en-US" dirty="0" smtClean="0"/>
+              <a:t>Add it to the </a:t>
+            </a:r>
+            <a:r>
+              <a:rPr lang="en-US" dirty="0" err="1" smtClean="0"/>
+              <a:t>package.json</a:t>
+            </a:r>
+            <a:endParaRPr lang="en-US" dirty="0" smtClean="0"/>
+          </a:p>
+          <a:p>
+            <a:r>
+              <a:rPr lang="en-US" dirty="0" smtClean="0"/>
+              <a:t>In Visual Studio &gt; right click NPM to add module</a:t>
+            </a:r>
+          </a:p>
+          <a:p>
+            <a:r>
+              <a:rPr lang="en-US" dirty="0"/>
+              <a:t>Or from the command prompt : </a:t>
+            </a:r>
+            <a:endParaRPr lang="en-US" dirty="0" smtClean="0"/>
+          </a:p>
+          <a:p>
+            <a:pPr marL="0" indent="0">
+              <a:buNone/>
+            </a:pPr>
+            <a:r>
+              <a:rPr lang="en-US" sz="2000" dirty="0" err="1">
+                <a:latin typeface="Courier New" panose="02070309020205020404" pitchFamily="49" charset="0"/>
+                <a:cs typeface="Courier New" panose="02070309020205020404" pitchFamily="49" charset="0"/>
+              </a:rPr>
+              <a:t>npm</a:t>
+            </a:r>
+            <a:r>
+              <a:rPr lang="en-US" sz="2000" dirty="0">
+                <a:latin typeface="Courier New" panose="02070309020205020404" pitchFamily="49" charset="0"/>
+                <a:cs typeface="Courier New" panose="02070309020205020404" pitchFamily="49" charset="0"/>
+              </a:rPr>
+              <a:t> install </a:t>
+            </a:r>
+            <a:r>
+              <a:rPr lang="en-US" sz="2000" dirty="0" smtClean="0">
+                <a:latin typeface="Courier New" panose="02070309020205020404" pitchFamily="49" charset="0"/>
+                <a:cs typeface="Courier New" panose="02070309020205020404" pitchFamily="49" charset="0"/>
+              </a:rPr>
+              <a:t>--save </a:t>
+            </a:r>
+            <a:r>
+              <a:rPr lang="en-US" sz="2000" dirty="0" err="1" smtClean="0">
+                <a:latin typeface="Courier New" panose="02070309020205020404" pitchFamily="49" charset="0"/>
+                <a:cs typeface="Courier New" panose="02070309020205020404" pitchFamily="49" charset="0"/>
+              </a:rPr>
+              <a:t>mongodb</a:t>
+            </a:r>
+            <a:r>
+              <a:rPr lang="en-US" sz="2000" dirty="0" smtClean="0">
+                <a:latin typeface="Courier New" panose="02070309020205020404" pitchFamily="49" charset="0"/>
+                <a:cs typeface="Courier New" panose="02070309020205020404" pitchFamily="49" charset="0"/>
+              </a:rPr>
+              <a:t> </a:t>
+            </a:r>
+            <a:endParaRPr lang="en-US" sz="2000" dirty="0">
+              <a:latin typeface="Courier New" panose="02070309020205020404" pitchFamily="49" charset="0"/>
+              <a:cs typeface="Courier New" panose="02070309020205020404" pitchFamily="49" charset="0"/>
+            </a:endParaRPr>
+          </a:p>
+          <a:p>
+            <a:pPr marL="0" indent="0">
+              <a:buNone/>
+            </a:pPr>
+            <a:endParaRPr lang="en-US" dirty="0" smtClean="0"/>
+          </a:p>
+        </p:txBody>
+      </p:sp>
     </p:spTree>
     <p:extLst>
       <p:ext uri="{BB962C8B-B14F-4D97-AF65-F5344CB8AC3E}">
@@ -22859,21 +23181,10 @@
               <a:buAutoNum type="arabicParenR"/>
             </a:pPr>
             <a:r>
-              <a:rPr lang="en-GB" dirty="0" smtClean="0"/>
-              <a:t>Using </a:t>
-            </a:r>
-            <a:r>
-              <a:rPr lang="en-GB" dirty="0" err="1" smtClean="0"/>
-              <a:t>DocumentDB</a:t>
-            </a:r>
-            <a:r>
-              <a:rPr lang="en-GB" dirty="0" smtClean="0"/>
-              <a:t> to </a:t>
-            </a:r>
-            <a:r>
-              <a:rPr lang="en-GB" dirty="0" smtClean="0"/>
-              <a:t>save messages and emit last received messages</a:t>
-            </a:r>
+              <a:rPr lang="en-GB" dirty="0"/>
+              <a:t>Using a NoSQL Database</a:t>
+            </a:r>
+            <a:endParaRPr lang="en-GB" dirty="0" smtClean="0"/>
           </a:p>
         </p:txBody>
       </p:sp>
@@ -23105,7 +23416,15 @@
             </a:r>
             <a:r>
               <a:rPr lang="en-US" dirty="0"/>
-              <a:t>is supposed by several browsers including Internet Explorer, Google Chrome, Firefox, Safari and </a:t>
+              <a:t>is supposed by several browsers including </a:t>
+            </a:r>
+            <a:r>
+              <a:rPr lang="en-US" dirty="0" smtClean="0"/>
+              <a:t>Microsoft Edge, Internet </a:t>
+            </a:r>
+            <a:r>
+              <a:rPr lang="en-US" dirty="0"/>
+              <a:t>Explorer, Google Chrome, Firefox, Safari and </a:t>
             </a:r>
             <a:r>
               <a:rPr lang="en-US" dirty="0" smtClean="0"/>
@@ -23307,17 +23626,13 @@
         <p:spPr/>
         <p:txBody>
           <a:bodyPr>
-            <a:normAutofit fontScale="90000"/>
+            <a:normAutofit/>
           </a:bodyPr>
           <a:lstStyle/>
           <a:p>
             <a:r>
-              <a:rPr lang="en-GB" dirty="0"/>
-              <a:t>Implementing Socket.IO to connect, send and receive </a:t>
-            </a:r>
-            <a:r>
-              <a:rPr lang="en-GB" dirty="0" smtClean="0"/>
-              <a:t>messages</a:t>
+              <a:rPr lang="en-US" dirty="0"/>
+              <a:t>Using Socket.IO to connect users, broadcast and receive messages</a:t>
             </a:r>
             <a:endParaRPr lang="en-US" dirty="0"/>
           </a:p>
@@ -23433,9 +23748,10 @@
           </a:p>
           <a:p>
             <a:r>
-              <a:rPr lang="en-US" dirty="0" smtClean="0"/>
-              <a:t>OR: </a:t>
-            </a:r>
+              <a:rPr lang="en-US" dirty="0"/>
+              <a:t>Or from the command prompt : </a:t>
+            </a:r>
+            <a:endParaRPr lang="en-US" dirty="0" smtClean="0"/>
           </a:p>
           <a:p>
             <a:pPr marL="0" indent="0">
@@ -25725,21 +26041,6 @@
 </file>
 
 <file path=customXml/item1.xml><?xml version="1.0" encoding="utf-8"?>
-<p:properties xmlns:p="http://schemas.microsoft.com/office/2006/metadata/properties" xmlns:xsi="http://www.w3.org/2001/XMLSchema-instance" xmlns:pc="http://schemas.microsoft.com/office/infopath/2007/PartnerControls">
-  <documentManagement/>
-</p:properties>
-</file>
-
-<file path=customXml/item2.xml><?xml version="1.0" encoding="utf-8"?>
-<?mso-contentType ?>
-<FormTemplates xmlns="http://schemas.microsoft.com/sharepoint/v3/contenttype/forms">
-  <Display>DocumentLibraryForm</Display>
-  <Edit>DocumentLibraryForm</Edit>
-  <New>DocumentLibraryForm</New>
-</FormTemplates>
-</file>
-
-<file path=customXml/item3.xml><?xml version="1.0" encoding="utf-8"?>
 <ct:contentTypeSchema xmlns:ct="http://schemas.microsoft.com/office/2006/metadata/contentType" xmlns:ma="http://schemas.microsoft.com/office/2006/metadata/properties/metaAttributes" ct:_="" ma:_="" ma:contentTypeName="Document" ma:contentTypeID="0x010100391E57C78B9F604FB8BAD296D1460E2A" ma:contentTypeVersion="1" ma:contentTypeDescription="Create a new document." ma:contentTypeScope="" ma:versionID="fb382fe2362acd2155f454904f478e4d">
   <xsd:schema xmlns:xsd="http://www.w3.org/2001/XMLSchema" xmlns:xs="http://www.w3.org/2001/XMLSchema" xmlns:p="http://schemas.microsoft.com/office/2006/metadata/properties" xmlns:ns3="636b0322-90fb-440c-9cbc-22749e7231e9" targetNamespace="http://schemas.microsoft.com/office/2006/metadata/properties" ma:root="true" ma:fieldsID="b9887c63ce4710c1aeb75a5f03aecb69" ns3:_="">
     <xsd:import namespace="636b0322-90fb-440c-9cbc-22749e7231e9"/>
@@ -25879,31 +26180,22 @@
 </ct:contentTypeSchema>
 </file>
 
-<file path=customXml/itemProps1.xml><?xml version="1.0" encoding="utf-8"?>
-<ds:datastoreItem xmlns:ds="http://schemas.openxmlformats.org/officeDocument/2006/customXml" ds:itemID="{7025FDD9-4C58-4084-9F89-0E6ADD6FFF55}">
-  <ds:schemaRefs>
-    <ds:schemaRef ds:uri="http://purl.org/dc/terms/"/>
-    <ds:schemaRef ds:uri="http://schemas.openxmlformats.org/package/2006/metadata/core-properties"/>
-    <ds:schemaRef ds:uri="http://schemas.microsoft.com/office/2006/documentManagement/types"/>
-    <ds:schemaRef ds:uri="http://schemas.microsoft.com/office/infopath/2007/PartnerControls"/>
-    <ds:schemaRef ds:uri="http://purl.org/dc/elements/1.1/"/>
-    <ds:schemaRef ds:uri="http://schemas.microsoft.com/office/2006/metadata/properties"/>
-    <ds:schemaRef ds:uri="636b0322-90fb-440c-9cbc-22749e7231e9"/>
-    <ds:schemaRef ds:uri="http://www.w3.org/XML/1998/namespace"/>
-    <ds:schemaRef ds:uri="http://purl.org/dc/dcmitype/"/>
-  </ds:schemaRefs>
-</ds:datastoreItem>
+<file path=customXml/item2.xml><?xml version="1.0" encoding="utf-8"?>
+<?mso-contentType ?>
+<FormTemplates xmlns="http://schemas.microsoft.com/sharepoint/v3/contenttype/forms">
+  <Display>DocumentLibraryForm</Display>
+  <Edit>DocumentLibraryForm</Edit>
+  <New>DocumentLibraryForm</New>
+</FormTemplates>
 </file>
 
-<file path=customXml/itemProps2.xml><?xml version="1.0" encoding="utf-8"?>
-<ds:datastoreItem xmlns:ds="http://schemas.openxmlformats.org/officeDocument/2006/customXml" ds:itemID="{B0CA13EC-1D3C-4D6F-8D1C-E8A452CFC79A}">
-  <ds:schemaRefs>
-    <ds:schemaRef ds:uri="http://schemas.microsoft.com/sharepoint/v3/contenttype/forms"/>
-  </ds:schemaRefs>
-</ds:datastoreItem>
+<file path=customXml/item3.xml><?xml version="1.0" encoding="utf-8"?>
+<p:properties xmlns:p="http://schemas.microsoft.com/office/2006/metadata/properties" xmlns:xsi="http://www.w3.org/2001/XMLSchema-instance" xmlns:pc="http://schemas.microsoft.com/office/infopath/2007/PartnerControls">
+  <documentManagement/>
+</p:properties>
 </file>
 
-<file path=customXml/itemProps3.xml><?xml version="1.0" encoding="utf-8"?>
+<file path=customXml/itemProps1.xml><?xml version="1.0" encoding="utf-8"?>
 <ds:datastoreItem xmlns:ds="http://schemas.openxmlformats.org/officeDocument/2006/customXml" ds:itemID="{7B70CE0C-0988-423A-BF66-B40F6A1061FF}">
   <ds:schemaRefs>
     <ds:schemaRef ds:uri="http://schemas.microsoft.com/office/2006/metadata/contentType"/>
@@ -25919,4 +26211,28 @@
     <ds:schemaRef ds:uri="http://schemas.microsoft.com/internal/obd"/>
   </ds:schemaRefs>
 </ds:datastoreItem>
+</file>
+
+<file path=customXml/itemProps2.xml><?xml version="1.0" encoding="utf-8"?>
+<ds:datastoreItem xmlns:ds="http://schemas.openxmlformats.org/officeDocument/2006/customXml" ds:itemID="{B0CA13EC-1D3C-4D6F-8D1C-E8A452CFC79A}">
+  <ds:schemaRefs>
+    <ds:schemaRef ds:uri="http://schemas.microsoft.com/sharepoint/v3/contenttype/forms"/>
+  </ds:schemaRefs>
+</ds:datastoreItem>
+</file>
+
+<file path=customXml/itemProps3.xml><?xml version="1.0" encoding="utf-8"?>
+<ds:datastoreItem xmlns:ds="http://schemas.openxmlformats.org/officeDocument/2006/customXml" ds:itemID="{7025FDD9-4C58-4084-9F89-0E6ADD6FFF55}">
+  <ds:schemaRefs>
+    <ds:schemaRef ds:uri="http://purl.org/dc/terms/"/>
+    <ds:schemaRef ds:uri="http://schemas.openxmlformats.org/package/2006/metadata/core-properties"/>
+    <ds:schemaRef ds:uri="http://schemas.microsoft.com/office/2006/documentManagement/types"/>
+    <ds:schemaRef ds:uri="http://schemas.microsoft.com/office/infopath/2007/PartnerControls"/>
+    <ds:schemaRef ds:uri="http://purl.org/dc/elements/1.1/"/>
+    <ds:schemaRef ds:uri="http://schemas.microsoft.com/office/2006/metadata/properties"/>
+    <ds:schemaRef ds:uri="636b0322-90fb-440c-9cbc-22749e7231e9"/>
+    <ds:schemaRef ds:uri="http://www.w3.org/XML/1998/namespace"/>
+    <ds:schemaRef ds:uri="http://purl.org/dc/dcmitype/"/>
+  </ds:schemaRefs>
+</ds:datastoreItem>
 </file>
</xml_diff>